<commit_message>
Update PPT for DB
</commit_message>
<xml_diff>
--- a/PPT/DB.pptx
+++ b/PPT/DB.pptx
@@ -5,16 +5,17 @@
     <p:sldMasterId id="2147483660" r:id="rId1"/>
   </p:sldMasterIdLst>
   <p:notesMasterIdLst>
-    <p:notesMasterId r:id="rId6"/>
+    <p:notesMasterId r:id="rId7"/>
   </p:notesMasterIdLst>
   <p:handoutMasterIdLst>
-    <p:handoutMasterId r:id="rId7"/>
+    <p:handoutMasterId r:id="rId8"/>
   </p:handoutMasterIdLst>
   <p:sldIdLst>
     <p:sldId id="256" r:id="rId2"/>
     <p:sldId id="257" r:id="rId3"/>
     <p:sldId id="258" r:id="rId4"/>
     <p:sldId id="259" r:id="rId5"/>
+    <p:sldId id="260" r:id="rId6"/>
   </p:sldIdLst>
   <p:sldSz cx="9144000" cy="6858000" type="screen4x3"/>
   <p:notesSz cx="6858000" cy="9144000"/>
@@ -218,7 +219,7 @@
             <a:fld id="{5E9302A7-8594-484F-B726-A0F71F65036D}" type="datetimeFigureOut">
               <a:rPr lang="zh-CN" altLang="en-US" smtClean="0"/>
               <a:pPr/>
-              <a:t>2017/3/17</a:t>
+              <a:t>2017/3/20</a:t>
             </a:fld>
             <a:endParaRPr lang="zh-CN" altLang="en-US"/>
           </a:p>
@@ -385,7 +386,7 @@
             <a:fld id="{A5A8A0BA-708B-4B98-852A-71DC09C17B9A}" type="datetimeFigureOut">
               <a:rPr lang="zh-CN" altLang="en-US" smtClean="0"/>
               <a:pPr/>
-              <a:t>2017/3/17</a:t>
+              <a:t>2017/3/20</a:t>
             </a:fld>
             <a:endParaRPr lang="zh-CN" altLang="en-US"/>
           </a:p>
@@ -845,7 +846,7 @@
             <a:fld id="{79A26581-C842-49D0-AB93-D089A5BA37C7}" type="datetime1">
               <a:rPr lang="zh-CN" altLang="en-US" smtClean="0"/>
               <a:pPr/>
-              <a:t>2017/3/17</a:t>
+              <a:t>2017/3/20</a:t>
             </a:fld>
             <a:endParaRPr lang="zh-CN" altLang="en-US" dirty="0"/>
           </a:p>
@@ -1019,7 +1020,7 @@
             <a:fld id="{F2B461BA-1B2E-4425-B18A-43269697AD3D}" type="datetime1">
               <a:rPr lang="zh-CN" altLang="en-US" smtClean="0"/>
               <a:pPr/>
-              <a:t>2017/3/17</a:t>
+              <a:t>2017/3/20</a:t>
             </a:fld>
             <a:endParaRPr lang="zh-CN" altLang="en-US"/>
           </a:p>
@@ -1203,7 +1204,7 @@
             <a:fld id="{15520F5A-7510-46CC-AA86-3124215E8D22}" type="datetime1">
               <a:rPr lang="zh-CN" altLang="en-US" smtClean="0"/>
               <a:pPr/>
-              <a:t>2017/3/17</a:t>
+              <a:t>2017/3/20</a:t>
             </a:fld>
             <a:endParaRPr lang="zh-CN" altLang="en-US"/>
           </a:p>
@@ -1444,7 +1445,7 @@
             <a:fld id="{4EE09118-F6C0-44B1-AEB0-E70B108D11CB}" type="datetime1">
               <a:rPr lang="zh-CN" altLang="en-US" smtClean="0"/>
               <a:pPr/>
-              <a:t>2017/3/17</a:t>
+              <a:t>2017/3/20</a:t>
             </a:fld>
             <a:endParaRPr lang="zh-CN" altLang="en-US"/>
           </a:p>
@@ -1694,7 +1695,7 @@
             <a:fld id="{FFE509C5-9A07-431C-A613-704709B1F7E2}" type="datetime1">
               <a:rPr lang="zh-CN" altLang="en-US" smtClean="0"/>
               <a:pPr/>
-              <a:t>2017/3/17</a:t>
+              <a:t>2017/3/20</a:t>
             </a:fld>
             <a:endParaRPr lang="zh-CN" altLang="en-US"/>
           </a:p>
@@ -1986,7 +1987,7 @@
             <a:fld id="{8967B1C6-3ABD-4489-8AE2-134FC68E6291}" type="datetime1">
               <a:rPr lang="zh-CN" altLang="en-US" smtClean="0"/>
               <a:pPr/>
-              <a:t>2017/3/17</a:t>
+              <a:t>2017/3/20</a:t>
             </a:fld>
             <a:endParaRPr lang="zh-CN" altLang="en-US"/>
           </a:p>
@@ -2412,7 +2413,7 @@
             <a:fld id="{9C7A688F-5B34-48E1-B87F-DEEE44579934}" type="datetime1">
               <a:rPr lang="zh-CN" altLang="en-US" smtClean="0"/>
               <a:pPr/>
-              <a:t>2017/3/17</a:t>
+              <a:t>2017/3/20</a:t>
             </a:fld>
             <a:endParaRPr lang="zh-CN" altLang="en-US"/>
           </a:p>
@@ -2534,7 +2535,7 @@
             <a:fld id="{0E293655-0C55-4EBC-9662-DF4B811530CC}" type="datetime1">
               <a:rPr lang="zh-CN" altLang="en-US" smtClean="0"/>
               <a:pPr/>
-              <a:t>2017/3/17</a:t>
+              <a:t>2017/3/20</a:t>
             </a:fld>
             <a:endParaRPr lang="zh-CN" altLang="en-US"/>
           </a:p>
@@ -2633,7 +2634,7 @@
             <a:fld id="{B3D1C92C-9441-4593-BA63-8806E2668D59}" type="datetime1">
               <a:rPr lang="zh-CN" altLang="en-US" smtClean="0"/>
               <a:pPr/>
-              <a:t>2017/3/17</a:t>
+              <a:t>2017/3/20</a:t>
             </a:fld>
             <a:endParaRPr lang="zh-CN" altLang="en-US"/>
           </a:p>
@@ -2914,7 +2915,7 @@
             <a:fld id="{3282DFAC-E1C2-4166-88BF-52A1C1D21E8D}" type="datetime1">
               <a:rPr lang="zh-CN" altLang="en-US" smtClean="0"/>
               <a:pPr/>
-              <a:t>2017/3/17</a:t>
+              <a:t>2017/3/20</a:t>
             </a:fld>
             <a:endParaRPr lang="zh-CN" altLang="en-US"/>
           </a:p>
@@ -3171,7 +3172,7 @@
             <a:fld id="{3A8E4DE7-673F-4F05-9AEF-EE5581AABA64}" type="datetime1">
               <a:rPr lang="zh-CN" altLang="en-US" smtClean="0"/>
               <a:pPr/>
-              <a:t>2017/3/17</a:t>
+              <a:t>2017/3/20</a:t>
             </a:fld>
             <a:endParaRPr lang="zh-CN" altLang="en-US"/>
           </a:p>
@@ -3395,7 +3396,7 @@
             <a:fld id="{7BDB4ED8-B771-44BC-BE60-EE283D0BE87C}" type="datetime1">
               <a:rPr lang="zh-CN" altLang="en-US" smtClean="0"/>
               <a:pPr/>
-              <a:t>2017/3/17</a:t>
+              <a:t>2017/3/20</a:t>
             </a:fld>
             <a:endParaRPr lang="zh-CN" altLang="en-US" dirty="0"/>
           </a:p>
@@ -3822,11 +3823,7 @@
           <a:p>
             <a:r>
               <a:rPr lang="en-US" altLang="zh-CN" dirty="0" smtClean="0"/>
-              <a:t>--By </a:t>
-            </a:r>
-            <a:r>
-              <a:rPr lang="en-US" altLang="zh-CN" dirty="0" smtClean="0"/>
-              <a:t>Shengli</a:t>
+              <a:t>--By Shengli</a:t>
             </a:r>
           </a:p>
           <a:p>
@@ -3856,7 +3853,7 @@
             <a:fld id="{C747BEE7-1600-4E86-851F-873E5728A0D8}" type="datetime1">
               <a:rPr lang="zh-CN" altLang="en-US" smtClean="0"/>
               <a:pPr/>
-              <a:t>2017/3/17</a:t>
+              <a:t>2017/3/20</a:t>
             </a:fld>
             <a:endParaRPr lang="zh-CN" altLang="en-US" dirty="0"/>
           </a:p>
@@ -3986,7 +3983,7 @@
             <a:fld id="{79A26581-C842-49D0-AB93-D089A5BA37C7}" type="datetime1">
               <a:rPr lang="zh-CN" altLang="en-US" smtClean="0"/>
               <a:pPr/>
-              <a:t>2017/3/17</a:t>
+              <a:t>2017/3/20</a:t>
             </a:fld>
             <a:endParaRPr lang="zh-CN" altLang="en-US" dirty="0"/>
           </a:p>
@@ -4202,7 +4199,7 @@
             <a:fld id="{4EE09118-F6C0-44B1-AEB0-E70B108D11CB}" type="datetime1">
               <a:rPr lang="zh-CN" altLang="en-US" smtClean="0"/>
               <a:pPr/>
-              <a:t>2017/3/17</a:t>
+              <a:t>2017/3/20</a:t>
             </a:fld>
             <a:endParaRPr lang="zh-CN" altLang="en-US"/>
           </a:p>
@@ -4392,7 +4389,7 @@
             <a:fld id="{4EE09118-F6C0-44B1-AEB0-E70B108D11CB}" type="datetime1">
               <a:rPr lang="zh-CN" altLang="en-US" smtClean="0"/>
               <a:pPr/>
-              <a:t>2017/3/17</a:t>
+              <a:t>2017/3/20</a:t>
             </a:fld>
             <a:endParaRPr lang="zh-CN" altLang="en-US"/>
           </a:p>
@@ -4486,6 +4483,206 @@
     <p:extLst>
       <p:ext uri="{BB962C8B-B14F-4D97-AF65-F5344CB8AC3E}">
         <p14:creationId xmlns:p14="http://schemas.microsoft.com/office/powerpoint/2010/main" val="908796380"/>
+      </p:ext>
+    </p:extLst>
+  </p:cSld>
+  <p:clrMapOvr>
+    <a:masterClrMapping/>
+  </p:clrMapOvr>
+</p:sld>
+</file>
+
+<file path=ppt/slides/slide5.xml><?xml version="1.0" encoding="utf-8"?>
+<p:sld xmlns:a="http://schemas.openxmlformats.org/drawingml/2006/main" xmlns:r="http://schemas.openxmlformats.org/officeDocument/2006/relationships" xmlns:p="http://schemas.openxmlformats.org/presentationml/2006/main">
+  <p:cSld>
+    <p:spTree>
+      <p:nvGrpSpPr>
+        <p:cNvPr id="1" name=""/>
+        <p:cNvGrpSpPr/>
+        <p:nvPr/>
+      </p:nvGrpSpPr>
+      <p:grpSpPr>
+        <a:xfrm>
+          <a:off x="0" y="0"/>
+          <a:ext cx="0" cy="0"/>
+          <a:chOff x="0" y="0"/>
+          <a:chExt cx="0" cy="0"/>
+        </a:xfrm>
+      </p:grpSpPr>
+      <p:sp>
+        <p:nvSpPr>
+          <p:cNvPr id="2" name="Title 1"/>
+          <p:cNvSpPr>
+            <a:spLocks noGrp="1"/>
+          </p:cNvSpPr>
+          <p:nvPr>
+            <p:ph type="title"/>
+          </p:nvPr>
+        </p:nvSpPr>
+        <p:spPr/>
+        <p:txBody>
+          <a:bodyPr/>
+          <a:lstStyle/>
+          <a:p>
+            <a:r>
+              <a:rPr lang="en-US" smtClean="0"/>
+              <a:t>Tablespaces and </a:t>
+            </a:r>
+            <a:r>
+              <a:rPr lang="en-US" dirty="0" err="1" smtClean="0"/>
+              <a:t>Datafiles</a:t>
+            </a:r>
+            <a:endParaRPr lang="en-US" dirty="0"/>
+          </a:p>
+        </p:txBody>
+      </p:sp>
+      <p:sp>
+        <p:nvSpPr>
+          <p:cNvPr id="3" name="Content Placeholder 2"/>
+          <p:cNvSpPr>
+            <a:spLocks noGrp="1"/>
+          </p:cNvSpPr>
+          <p:nvPr>
+            <p:ph idx="1"/>
+          </p:nvPr>
+        </p:nvSpPr>
+        <p:spPr>
+          <a:xfrm>
+            <a:off x="457200" y="1124745"/>
+            <a:ext cx="8075240" cy="1512167"/>
+          </a:xfrm>
+        </p:spPr>
+        <p:txBody>
+          <a:bodyPr>
+            <a:normAutofit fontScale="55000" lnSpcReduction="20000"/>
+          </a:bodyPr>
+          <a:lstStyle/>
+          <a:p>
+            <a:r>
+              <a:rPr lang="en-US" dirty="0"/>
+              <a:t>An Oracle database consists of one or more logical storage units called tablespaces, which collectively store all of the database's </a:t>
+            </a:r>
+            <a:r>
+              <a:rPr lang="en-US" dirty="0" smtClean="0"/>
+              <a:t>data.</a:t>
+            </a:r>
+          </a:p>
+          <a:p>
+            <a:r>
+              <a:rPr lang="en-US" dirty="0"/>
+              <a:t>Each tablespace in an Oracle database consists of one or more files called </a:t>
+            </a:r>
+            <a:r>
+              <a:rPr lang="en-US" dirty="0" err="1"/>
+              <a:t>datafiles</a:t>
+            </a:r>
+            <a:r>
+              <a:rPr lang="en-US" dirty="0"/>
+              <a:t>, which are physical structures that conform to the operating system in which Oracle is running</a:t>
+            </a:r>
+            <a:r>
+              <a:rPr lang="en-US" dirty="0" smtClean="0"/>
+              <a:t>.</a:t>
+            </a:r>
+          </a:p>
+          <a:p>
+            <a:r>
+              <a:rPr lang="en-US" dirty="0"/>
+              <a:t>A database's data is collectively stored in the </a:t>
+            </a:r>
+            <a:r>
+              <a:rPr lang="en-US" dirty="0" err="1"/>
+              <a:t>datafiles</a:t>
+            </a:r>
+            <a:r>
+              <a:rPr lang="en-US" dirty="0"/>
+              <a:t> that constitute each tablespace of the database.</a:t>
+            </a:r>
+          </a:p>
+        </p:txBody>
+      </p:sp>
+      <p:sp>
+        <p:nvSpPr>
+          <p:cNvPr id="4" name="Date Placeholder 3"/>
+          <p:cNvSpPr>
+            <a:spLocks noGrp="1"/>
+          </p:cNvSpPr>
+          <p:nvPr>
+            <p:ph type="dt" sz="half" idx="10"/>
+          </p:nvPr>
+        </p:nvSpPr>
+        <p:spPr/>
+        <p:txBody>
+          <a:bodyPr/>
+          <a:lstStyle/>
+          <a:p>
+            <a:fld id="{4EE09118-F6C0-44B1-AEB0-E70B108D11CB}" type="datetime1">
+              <a:rPr lang="zh-CN" altLang="en-US" smtClean="0"/>
+              <a:pPr/>
+              <a:t>2017/3/20</a:t>
+            </a:fld>
+            <a:endParaRPr lang="zh-CN" altLang="en-US"/>
+          </a:p>
+        </p:txBody>
+      </p:sp>
+      <p:sp>
+        <p:nvSpPr>
+          <p:cNvPr id="5" name="Slide Number Placeholder 4"/>
+          <p:cNvSpPr>
+            <a:spLocks noGrp="1"/>
+          </p:cNvSpPr>
+          <p:nvPr>
+            <p:ph type="sldNum" sz="quarter" idx="12"/>
+          </p:nvPr>
+        </p:nvSpPr>
+        <p:spPr/>
+        <p:txBody>
+          <a:bodyPr/>
+          <a:lstStyle/>
+          <a:p>
+            <a:fld id="{B3D1565B-4E83-45B7-9B19-292BF6FE1A2E}" type="slidenum">
+              <a:rPr lang="zh-CN" altLang="en-US" smtClean="0"/>
+              <a:pPr/>
+              <a:t>5</a:t>
+            </a:fld>
+            <a:endParaRPr lang="zh-CN" altLang="en-US"/>
+          </a:p>
+        </p:txBody>
+      </p:sp>
+      <p:pic>
+        <p:nvPicPr>
+          <p:cNvPr id="6" name="Picture 5"/>
+          <p:cNvPicPr>
+            <a:picLocks noChangeAspect="1"/>
+          </p:cNvPicPr>
+          <p:nvPr/>
+        </p:nvPicPr>
+        <p:blipFill>
+          <a:blip r:embed="rId2">
+            <a:extLst>
+              <a:ext uri="{28A0092B-C50C-407E-A947-70E740481C1C}">
+                <a14:useLocalDpi xmlns:a14="http://schemas.microsoft.com/office/drawing/2010/main" val="0"/>
+              </a:ext>
+            </a:extLst>
+          </a:blip>
+          <a:stretch>
+            <a:fillRect/>
+          </a:stretch>
+        </p:blipFill>
+        <p:spPr>
+          <a:xfrm>
+            <a:off x="2195736" y="2498725"/>
+            <a:ext cx="4972050" cy="3857625"/>
+          </a:xfrm>
+          <a:prstGeom prst="rect">
+            <a:avLst/>
+          </a:prstGeom>
+        </p:spPr>
+      </p:pic>
+    </p:spTree>
+    <p:extLst>
+      <p:ext uri="{BB962C8B-B14F-4D97-AF65-F5344CB8AC3E}">
+        <p14:creationId xmlns:p14="http://schemas.microsoft.com/office/powerpoint/2010/main" val="475220207"/>
       </p:ext>
     </p:extLst>
   </p:cSld>

</xml_diff>